<commit_message>
updated PaperChoices and added notes to due.
</commit_message>
<xml_diff>
--- a/slides/cm042.pptx
+++ b/slides/cm042.pptx
@@ -388,7 +388,7 @@
           <a:p>
             <a:fld id="{E6FD33F6-7232-004C-BD3D-E6296B401602}" type="datetimeFigureOut">
               <a:rPr lang="en-US" smtClean="0"/>
-              <a:t>9/26/2018</a:t>
+              <a:t>10/21/2018</a:t>
             </a:fld>
             <a:endParaRPr lang="en-US"/>
           </a:p>
@@ -553,7 +553,7 @@
           <a:p>
             <a:fld id="{1ACB6D0A-92E4-FC4A-8816-97F951F94145}" type="datetimeFigureOut">
               <a:rPr lang="en-US" smtClean="0"/>
-              <a:t>9/26/2018</a:t>
+              <a:t>10/21/2018</a:t>
             </a:fld>
             <a:endParaRPr lang="en-US"/>
           </a:p>
@@ -1185,7 +1185,7 @@
           <a:p>
             <a:fld id="{C8A432C8-69A7-458B-9684-2BFA64B31948}" type="datetime2">
               <a:rPr lang="en-US" smtClean="0"/>
-              <a:t>Wednesday, September 26, 2018</a:t>
+              <a:t>Sunday, October 21, 2018</a:t>
             </a:fld>
             <a:endParaRPr lang="en-US"/>
           </a:p>
@@ -1387,7 +1387,7 @@
           <a:p>
             <a:fld id="{8CC057FC-95B6-4D89-AFDA-ABA33EE921E5}" type="datetime2">
               <a:rPr lang="en-US" smtClean="0"/>
-              <a:t>Wednesday, September 26, 2018</a:t>
+              <a:t>Sunday, October 21, 2018</a:t>
             </a:fld>
             <a:endParaRPr lang="en-US"/>
           </a:p>
@@ -1564,7 +1564,7 @@
           <a:p>
             <a:fld id="{EC4549AC-EB31-477F-92A9-B1988E232878}" type="datetime2">
               <a:rPr lang="en-US" smtClean="0"/>
-              <a:t>Wednesday, September 26, 2018</a:t>
+              <a:t>Sunday, October 21, 2018</a:t>
             </a:fld>
             <a:endParaRPr lang="en-US"/>
           </a:p>
@@ -1731,7 +1731,7 @@
           <a:p>
             <a:fld id="{6396A3A3-94A6-4E5B-AF39-173ACA3E61CC}" type="datetime2">
               <a:rPr lang="en-US" smtClean="0"/>
-              <a:t>Wednesday, September 26, 2018</a:t>
+              <a:t>Sunday, October 21, 2018</a:t>
             </a:fld>
             <a:endParaRPr lang="en-US"/>
           </a:p>
@@ -1981,7 +1981,7 @@
           <a:p>
             <a:fld id="{9933D019-A32C-4EAD-B8E6-DBDA699692FD}" type="datetime2">
               <a:rPr lang="en-US" smtClean="0"/>
-              <a:t>Wednesday, September 26, 2018</a:t>
+              <a:t>Sunday, October 21, 2018</a:t>
             </a:fld>
             <a:endParaRPr lang="en-US"/>
           </a:p>
@@ -2301,7 +2301,7 @@
           <a:p>
             <a:fld id="{CCEBA98F-560C-4997-81C4-81D4D9187EAB}" type="datetime2">
               <a:rPr lang="en-US" smtClean="0"/>
-              <a:t>Wednesday, September 26, 2018</a:t>
+              <a:t>Sunday, October 21, 2018</a:t>
             </a:fld>
             <a:endParaRPr lang="en-US"/>
           </a:p>
@@ -2769,7 +2769,7 @@
           <a:p>
             <a:fld id="{150972B2-CA5C-437D-87D0-8081271A9E4B}" type="datetime2">
               <a:rPr lang="en-US" smtClean="0"/>
-              <a:t>Wednesday, September 26, 2018</a:t>
+              <a:t>Sunday, October 21, 2018</a:t>
             </a:fld>
             <a:endParaRPr lang="en-US"/>
           </a:p>
@@ -2919,7 +2919,7 @@
           <a:p>
             <a:fld id="{79CD4847-11EF-4466-A8AD-85CDB7B49118}" type="datetime2">
               <a:rPr lang="en-US" smtClean="0"/>
-              <a:t>Wednesday, September 26, 2018</a:t>
+              <a:t>Sunday, October 21, 2018</a:t>
             </a:fld>
             <a:endParaRPr lang="en-US"/>
           </a:p>
@@ -3011,7 +3011,7 @@
           <a:p>
             <a:fld id="{F168457A-3AB9-4880-8A0C-9F8524491207}" type="datetime2">
               <a:rPr lang="en-US" smtClean="0"/>
-              <a:t>Wednesday, September 26, 2018</a:t>
+              <a:t>Sunday, October 21, 2018</a:t>
             </a:fld>
             <a:endParaRPr lang="en-US"/>
           </a:p>
@@ -3287,7 +3287,7 @@
           <a:p>
             <a:fld id="{3FE976D3-5B7F-4300-ABED-C91F1B2AE209}" type="datetime2">
               <a:rPr lang="en-US" smtClean="0"/>
-              <a:t>Wednesday, September 26, 2018</a:t>
+              <a:t>Sunday, October 21, 2018</a:t>
             </a:fld>
             <a:endParaRPr lang="en-US"/>
           </a:p>
@@ -3594,7 +3594,7 @@
           <a:p>
             <a:fld id="{EBDC1E59-17DD-41CE-97CA-624A472382D4}" type="datetime2">
               <a:rPr lang="en-US" smtClean="0"/>
-              <a:t>Wednesday, September 26, 2018</a:t>
+              <a:t>Sunday, October 21, 2018</a:t>
             </a:fld>
             <a:endParaRPr lang="en-US"/>
           </a:p>
@@ -3898,7 +3898,7 @@
             <a:fld id="{A80CB818-7379-467D-8E76-EF9D9074A26C}" type="datetime2">
               <a:rPr lang="en-US" smtClean="0"/>
               <a:pPr/>
-              <a:t>Wednesday, September 26, 2018</a:t>
+              <a:t>Sunday, October 21, 2018</a:t>
             </a:fld>
             <a:endParaRPr lang="en-US" dirty="0"/>
           </a:p>
@@ -4340,7 +4340,6 @@
               <a:rPr lang="en-US" dirty="0"/>
               <a:t>Sampling distributions</a:t>
             </a:r>
-            <a:endParaRPr lang="en-US" dirty="0"/>
           </a:p>
         </p:txBody>
       </p:sp>
@@ -5190,8 +5189,8 @@
         </p:nvSpPr>
         <p:spPr>
           <a:xfrm>
-            <a:off x="3810000" y="5422900"/>
-            <a:ext cx="2626360" cy="1206500"/>
+            <a:off x="3636010" y="5347592"/>
+            <a:ext cx="2800350" cy="1281808"/>
           </a:xfrm>
           <a:prstGeom prst="wedgeEllipseCallout">
             <a:avLst>
@@ -5645,7 +5644,7 @@
         <p:spPr>
           <a:xfrm>
             <a:off x="6134100" y="1657560"/>
-            <a:ext cx="1117600" cy="369332"/>
+            <a:ext cx="1234440" cy="369332"/>
           </a:xfrm>
           <a:prstGeom prst="rect">
             <a:avLst/>
@@ -5804,8 +5803,8 @@
         </p:nvSpPr>
         <p:spPr>
           <a:xfrm>
-            <a:off x="1778001" y="4063238"/>
-            <a:ext cx="1198880" cy="369332"/>
+            <a:off x="1686560" y="4074255"/>
+            <a:ext cx="1290321" cy="369332"/>
           </a:xfrm>
           <a:prstGeom prst="rect">
             <a:avLst/>
@@ -5967,7 +5966,7 @@
         <p:spPr>
           <a:xfrm flipV="1">
             <a:off x="2976881" y="3230721"/>
-            <a:ext cx="487680" cy="1017183"/>
+            <a:ext cx="487680" cy="1028200"/>
           </a:xfrm>
           <a:prstGeom prst="line">
             <a:avLst/>
@@ -6003,7 +6002,7 @@
         <p:spPr>
           <a:xfrm>
             <a:off x="6271259" y="4576807"/>
-            <a:ext cx="1104900" cy="369332"/>
+            <a:ext cx="1363430" cy="369332"/>
           </a:xfrm>
           <a:prstGeom prst="rect">
             <a:avLst/>
@@ -7380,7 +7379,7 @@
         <p:spPr>
           <a:xfrm>
             <a:off x="6134100" y="1657560"/>
-            <a:ext cx="1117600" cy="369332"/>
+            <a:ext cx="1234440" cy="369332"/>
           </a:xfrm>
           <a:prstGeom prst="rect">
             <a:avLst/>
@@ -7539,8 +7538,8 @@
         </p:nvSpPr>
         <p:spPr>
           <a:xfrm>
-            <a:off x="1778001" y="4063238"/>
-            <a:ext cx="1198880" cy="369332"/>
+            <a:off x="1686560" y="4063238"/>
+            <a:ext cx="1290321" cy="369332"/>
           </a:xfrm>
           <a:prstGeom prst="rect">
             <a:avLst/>
@@ -7737,8 +7736,8 @@
         </p:nvSpPr>
         <p:spPr>
           <a:xfrm>
-            <a:off x="6271259" y="4576807"/>
-            <a:ext cx="1104900" cy="369332"/>
+            <a:off x="6271258" y="4576807"/>
+            <a:ext cx="1285241" cy="369332"/>
           </a:xfrm>
           <a:prstGeom prst="rect">
             <a:avLst/>
@@ -7838,7 +7837,7 @@
         <p:spPr>
           <a:xfrm flipH="1">
             <a:off x="5572762" y="4761473"/>
-            <a:ext cx="698497" cy="4609"/>
+            <a:ext cx="698496" cy="4609"/>
           </a:xfrm>
           <a:prstGeom prst="line">
             <a:avLst/>
@@ -9292,7 +9291,7 @@
         <p:spPr>
           <a:xfrm>
             <a:off x="6134100" y="1657560"/>
-            <a:ext cx="1117600" cy="369332"/>
+            <a:ext cx="1234440" cy="369332"/>
           </a:xfrm>
           <a:prstGeom prst="rect">
             <a:avLst/>
@@ -9389,7 +9388,7 @@
         <p:spPr>
           <a:xfrm>
             <a:off x="6565900" y="2504158"/>
-            <a:ext cx="1104900" cy="369332"/>
+            <a:ext cx="1209042" cy="369332"/>
           </a:xfrm>
           <a:prstGeom prst="rect">
             <a:avLst/>
@@ -9701,7 +9700,7 @@
         <p:spPr>
           <a:xfrm>
             <a:off x="6165850" y="4576807"/>
-            <a:ext cx="1104900" cy="369332"/>
+            <a:ext cx="1270536" cy="369332"/>
           </a:xfrm>
           <a:prstGeom prst="rect">
             <a:avLst/>
@@ -9836,8 +9835,8 @@
         </p:nvSpPr>
         <p:spPr>
           <a:xfrm>
-            <a:off x="2082800" y="5422900"/>
-            <a:ext cx="4838700" cy="1206500"/>
+            <a:off x="1905918" y="5422900"/>
+            <a:ext cx="5015582" cy="1455130"/>
           </a:xfrm>
           <a:prstGeom prst="wedgeEllipseCallout">
             <a:avLst>
@@ -10178,361 +10177,6 @@
           <a:chExt cx="0" cy="0"/>
         </a:xfrm>
       </p:grpSpPr>
-      <p:sp>
-        <p:nvSpPr>
-          <p:cNvPr id="2" name="Title 1"/>
-          <p:cNvSpPr>
-            <a:spLocks noGrp="1"/>
-          </p:cNvSpPr>
-          <p:nvPr>
-            <p:ph type="title"/>
-          </p:nvPr>
-        </p:nvSpPr>
-        <p:spPr/>
-        <p:txBody>
-          <a:bodyPr>
-            <a:normAutofit fontScale="90000"/>
-          </a:bodyPr>
-          <a:lstStyle/>
-          <a:p>
-            <a:r>
-              <a:rPr lang="en-US" dirty="0"/>
-              <a:t>Random variable, </a:t>
-            </a:r>
-            <a:r>
-              <a:rPr lang="en-US" i="1" dirty="0"/>
-              <a:t>X</a:t>
-            </a:r>
-            <a:r>
-              <a:rPr lang="en-US" dirty="0"/>
-              <a:t> = # of tweets per day</a:t>
-            </a:r>
-          </a:p>
-        </p:txBody>
-      </p:sp>
-      <p:sp>
-        <p:nvSpPr>
-          <p:cNvPr id="3" name="Content Placeholder 2"/>
-          <p:cNvSpPr>
-            <a:spLocks noGrp="1"/>
-          </p:cNvSpPr>
-          <p:nvPr>
-            <p:ph idx="1"/>
-          </p:nvPr>
-        </p:nvSpPr>
-        <p:spPr/>
-        <p:txBody>
-          <a:bodyPr/>
-          <a:lstStyle/>
-          <a:p>
-            <a:pPr marL="0" indent="0">
-              <a:buNone/>
-            </a:pPr>
-            <a:endParaRPr lang="en-US" i="1" dirty="0" smtClean="0"/>
-          </a:p>
-          <a:p>
-            <a:pPr marL="0" indent="0">
-              <a:buNone/>
-            </a:pPr>
-            <a:r>
-              <a:rPr lang="en-US" i="1" dirty="0" smtClean="0"/>
-              <a:t>f</a:t>
-            </a:r>
-            <a:r>
-              <a:rPr lang="en-US" i="1" dirty="0"/>
-              <a:t>(x</a:t>
-            </a:r>
-            <a:r>
-              <a:rPr lang="en-US" i="1" baseline="-25000" dirty="0"/>
-              <a:t>1</a:t>
-            </a:r>
-            <a:r>
-              <a:rPr lang="en-US" i="1" dirty="0"/>
-              <a:t>, …, </a:t>
-            </a:r>
-            <a:r>
-              <a:rPr lang="en-US" i="1" dirty="0" err="1"/>
-              <a:t>x</a:t>
-            </a:r>
-            <a:r>
-              <a:rPr lang="en-US" i="1" baseline="-25000" dirty="0" err="1"/>
-              <a:t>n</a:t>
-            </a:r>
-            <a:r>
-              <a:rPr lang="en-US" i="1" dirty="0"/>
-              <a:t>) = f(</a:t>
-            </a:r>
-            <a:r>
-              <a:rPr lang="en-US" i="1" dirty="0" smtClean="0"/>
-              <a:t>x</a:t>
-            </a:r>
-            <a:r>
-              <a:rPr lang="en-US" i="1" baseline="-25000" dirty="0" smtClean="0"/>
-              <a:t>1</a:t>
-            </a:r>
-            <a:r>
-              <a:rPr lang="en-US" i="1" dirty="0" smtClean="0"/>
-              <a:t>) × f</a:t>
-            </a:r>
-            <a:r>
-              <a:rPr lang="en-US" i="1" dirty="0"/>
-              <a:t>(x</a:t>
-            </a:r>
-            <a:r>
-              <a:rPr lang="en-US" i="1" baseline="-25000" dirty="0"/>
-              <a:t>2</a:t>
-            </a:r>
-            <a:r>
-              <a:rPr lang="en-US" i="1" dirty="0" smtClean="0"/>
-              <a:t>)</a:t>
-            </a:r>
-            <a:r>
-              <a:rPr lang="en-US" i="1" dirty="0"/>
-              <a:t> </a:t>
-            </a:r>
-            <a:r>
-              <a:rPr lang="en-US" i="1" dirty="0" smtClean="0"/>
-              <a:t>× … × f</a:t>
-            </a:r>
-            <a:r>
-              <a:rPr lang="en-US" i="1" dirty="0"/>
-              <a:t>(</a:t>
-            </a:r>
-            <a:r>
-              <a:rPr lang="en-US" i="1" dirty="0" err="1" smtClean="0"/>
-              <a:t>x</a:t>
-            </a:r>
-            <a:r>
-              <a:rPr lang="en-US" i="1" baseline="-25000" dirty="0" err="1" smtClean="0"/>
-              <a:t>n</a:t>
-            </a:r>
-            <a:r>
-              <a:rPr lang="en-US" i="1" dirty="0" smtClean="0"/>
-              <a:t>)  =</a:t>
-            </a:r>
-          </a:p>
-          <a:p>
-            <a:pPr marL="0" indent="0">
-              <a:buNone/>
-            </a:pPr>
-            <a:endParaRPr lang="en-US" i="1" dirty="0"/>
-          </a:p>
-          <a:p>
-            <a:pPr marL="0" indent="0">
-              <a:buNone/>
-            </a:pPr>
-            <a:endParaRPr lang="en-US" dirty="0"/>
-          </a:p>
-          <a:p>
-            <a:pPr marL="0" indent="0">
-              <a:buNone/>
-            </a:pPr>
-            <a:r>
-              <a:rPr lang="en-US" dirty="0"/>
-              <a:t>Since </a:t>
-            </a:r>
-            <a:r>
-              <a:rPr lang="en-US" i="1" dirty="0"/>
-              <a:t>X</a:t>
-            </a:r>
-            <a:r>
-              <a:rPr lang="en-US" i="1" baseline="-25000" dirty="0"/>
-              <a:t>1</a:t>
-            </a:r>
-            <a:r>
-              <a:rPr lang="en-US" i="1" dirty="0"/>
-              <a:t>, X</a:t>
-            </a:r>
-            <a:r>
-              <a:rPr lang="en-US" i="1" baseline="-25000" dirty="0"/>
-              <a:t>2</a:t>
-            </a:r>
-            <a:r>
-              <a:rPr lang="en-US" i="1" dirty="0"/>
-              <a:t>, …</a:t>
-            </a:r>
-            <a:r>
-              <a:rPr lang="en-US" i="1" dirty="0" err="1"/>
-              <a:t>X</a:t>
-            </a:r>
-            <a:r>
-              <a:rPr lang="en-US" i="1" baseline="-25000" dirty="0" err="1"/>
-              <a:t>n</a:t>
-            </a:r>
-            <a:r>
-              <a:rPr lang="en-US" baseline="-25000" dirty="0"/>
-              <a:t> </a:t>
-            </a:r>
-            <a:r>
-              <a:rPr lang="en-US" dirty="0"/>
-              <a:t>are </a:t>
-            </a:r>
-            <a:r>
-              <a:rPr lang="en-US" b="1" dirty="0" smtClean="0">
-                <a:solidFill>
-                  <a:srgbClr val="000000"/>
-                </a:solidFill>
-                <a:latin typeface="Lobster Two"/>
-                <a:cs typeface="Lobster Two"/>
-              </a:rPr>
-              <a:t>mutually independent, </a:t>
-            </a:r>
-            <a:r>
-              <a:rPr lang="en-US" dirty="0" smtClean="0"/>
-              <a:t>the probabilities P(</a:t>
-            </a:r>
-            <a:r>
-              <a:rPr lang="en-US" i="1" dirty="0" smtClean="0"/>
-              <a:t>X</a:t>
-            </a:r>
-            <a:r>
-              <a:rPr lang="en-US" i="1" baseline="-25000" dirty="0" smtClean="0"/>
-              <a:t>1</a:t>
-            </a:r>
-            <a:r>
-              <a:rPr lang="en-US" i="1" dirty="0" smtClean="0"/>
-              <a:t>), P(X</a:t>
-            </a:r>
-            <a:r>
-              <a:rPr lang="en-US" i="1" baseline="-25000" dirty="0" smtClean="0"/>
-              <a:t>2</a:t>
-            </a:r>
-            <a:r>
-              <a:rPr lang="en-US" i="1" dirty="0" smtClean="0"/>
-              <a:t>), …P(</a:t>
-            </a:r>
-            <a:r>
-              <a:rPr lang="en-US" i="1" dirty="0" err="1" smtClean="0"/>
-              <a:t>X</a:t>
-            </a:r>
-            <a:r>
-              <a:rPr lang="en-US" i="1" baseline="-25000" dirty="0" err="1" smtClean="0"/>
-              <a:t>n</a:t>
-            </a:r>
-            <a:r>
-              <a:rPr lang="en-US" i="1" dirty="0" smtClean="0"/>
-              <a:t>)</a:t>
-            </a:r>
-            <a:r>
-              <a:rPr lang="en-US" baseline="-25000" dirty="0" smtClean="0"/>
-              <a:t> </a:t>
-            </a:r>
-            <a:r>
-              <a:rPr lang="en-US" dirty="0" smtClean="0"/>
-              <a:t>can simply be multiplied to get the joint </a:t>
-            </a:r>
-            <a:r>
-              <a:rPr lang="en-US" dirty="0" err="1" smtClean="0"/>
-              <a:t>pdf</a:t>
-            </a:r>
-            <a:r>
-              <a:rPr lang="en-US" dirty="0" smtClean="0"/>
-              <a:t> of the sequence of observations of the </a:t>
-            </a:r>
-            <a:r>
-              <a:rPr lang="en-US" dirty="0" err="1" smtClean="0"/>
-              <a:t>rv</a:t>
-            </a:r>
-            <a:r>
-              <a:rPr lang="en-US" dirty="0" smtClean="0"/>
-              <a:t> of interest</a:t>
-            </a:r>
-          </a:p>
-          <a:p>
-            <a:pPr marL="0" indent="0">
-              <a:buNone/>
-            </a:pPr>
-            <a:endParaRPr lang="en-US" dirty="0"/>
-          </a:p>
-          <a:p>
-            <a:pPr marL="0" indent="0">
-              <a:buNone/>
-            </a:pPr>
-            <a:r>
-              <a:rPr lang="en-US" dirty="0"/>
-              <a:t>Since </a:t>
-            </a:r>
-            <a:r>
-              <a:rPr lang="en-US" i="1" dirty="0"/>
-              <a:t>X</a:t>
-            </a:r>
-            <a:r>
-              <a:rPr lang="en-US" i="1" baseline="-25000" dirty="0"/>
-              <a:t>1</a:t>
-            </a:r>
-            <a:r>
-              <a:rPr lang="en-US" i="1" dirty="0"/>
-              <a:t>, X</a:t>
-            </a:r>
-            <a:r>
-              <a:rPr lang="en-US" i="1" baseline="-25000" dirty="0"/>
-              <a:t>2</a:t>
-            </a:r>
-            <a:r>
-              <a:rPr lang="en-US" i="1" dirty="0"/>
-              <a:t>, …</a:t>
-            </a:r>
-            <a:r>
-              <a:rPr lang="en-US" i="1" dirty="0" err="1"/>
-              <a:t>X</a:t>
-            </a:r>
-            <a:r>
-              <a:rPr lang="en-US" i="1" baseline="-25000" dirty="0" err="1"/>
-              <a:t>n</a:t>
-            </a:r>
-            <a:r>
-              <a:rPr lang="en-US" baseline="-25000" dirty="0"/>
-              <a:t> </a:t>
-            </a:r>
-            <a:r>
-              <a:rPr lang="en-US" dirty="0"/>
-              <a:t>are </a:t>
-            </a:r>
-            <a:r>
-              <a:rPr lang="en-US" b="1" dirty="0">
-                <a:solidFill>
-                  <a:srgbClr val="000000"/>
-                </a:solidFill>
-                <a:latin typeface="Lobster Two"/>
-                <a:cs typeface="Lobster Two"/>
-              </a:rPr>
-              <a:t>identically distributed</a:t>
-            </a:r>
-            <a:r>
-              <a:rPr lang="en-US" dirty="0"/>
-              <a:t>, all marginal densities </a:t>
-            </a:r>
-            <a:r>
-              <a:rPr lang="en-US" i="1" dirty="0"/>
-              <a:t>f(x</a:t>
-            </a:r>
-            <a:r>
-              <a:rPr lang="en-US" i="1" baseline="-25000" dirty="0"/>
-              <a:t>i</a:t>
-            </a:r>
-            <a:r>
-              <a:rPr lang="en-US" i="1" dirty="0"/>
-              <a:t>) </a:t>
-            </a:r>
-            <a:r>
-              <a:rPr lang="en-US" dirty="0"/>
-              <a:t>are the exact same function</a:t>
-            </a:r>
-          </a:p>
-          <a:p>
-            <a:pPr marL="0" indent="0">
-              <a:buNone/>
-            </a:pPr>
-            <a:endParaRPr lang="en-US" dirty="0"/>
-          </a:p>
-          <a:p>
-            <a:pPr marL="0" indent="0">
-              <a:buNone/>
-            </a:pPr>
-            <a:endParaRPr lang="en-US" dirty="0"/>
-          </a:p>
-        </p:txBody>
-      </p:sp>
       <p:pic>
         <p:nvPicPr>
           <p:cNvPr id="4" name="Picture 3"/>
@@ -10557,6 +10201,355 @@
           </a:prstGeom>
         </p:spPr>
       </p:pic>
+      <p:sp>
+        <p:nvSpPr>
+          <p:cNvPr id="2" name="Title 1"/>
+          <p:cNvSpPr>
+            <a:spLocks noGrp="1"/>
+          </p:cNvSpPr>
+          <p:nvPr>
+            <p:ph type="title"/>
+          </p:nvPr>
+        </p:nvSpPr>
+        <p:spPr/>
+        <p:txBody>
+          <a:bodyPr>
+            <a:normAutofit fontScale="90000"/>
+          </a:bodyPr>
+          <a:lstStyle/>
+          <a:p>
+            <a:r>
+              <a:rPr lang="en-US" dirty="0"/>
+              <a:t>Random variable, </a:t>
+            </a:r>
+            <a:r>
+              <a:rPr lang="en-US" i="1" dirty="0"/>
+              <a:t>X</a:t>
+            </a:r>
+            <a:r>
+              <a:rPr lang="en-US" dirty="0"/>
+              <a:t> = # of tweets per day</a:t>
+            </a:r>
+          </a:p>
+        </p:txBody>
+      </p:sp>
+      <p:sp>
+        <p:nvSpPr>
+          <p:cNvPr id="3" name="Content Placeholder 2"/>
+          <p:cNvSpPr>
+            <a:spLocks noGrp="1"/>
+          </p:cNvSpPr>
+          <p:nvPr>
+            <p:ph idx="1"/>
+          </p:nvPr>
+        </p:nvSpPr>
+        <p:spPr/>
+        <p:txBody>
+          <a:bodyPr/>
+          <a:lstStyle/>
+          <a:p>
+            <a:pPr marL="0" indent="0">
+              <a:buNone/>
+            </a:pPr>
+            <a:endParaRPr lang="en-US" i="1" dirty="0" smtClean="0"/>
+          </a:p>
+          <a:p>
+            <a:pPr marL="0" indent="0">
+              <a:buNone/>
+            </a:pPr>
+            <a:r>
+              <a:rPr lang="en-US" i="1" dirty="0" smtClean="0"/>
+              <a:t>f</a:t>
+            </a:r>
+            <a:r>
+              <a:rPr lang="en-US" i="1" dirty="0"/>
+              <a:t>(x</a:t>
+            </a:r>
+            <a:r>
+              <a:rPr lang="en-US" i="1" baseline="-25000" dirty="0"/>
+              <a:t>1</a:t>
+            </a:r>
+            <a:r>
+              <a:rPr lang="en-US" i="1" dirty="0"/>
+              <a:t>, …, </a:t>
+            </a:r>
+            <a:r>
+              <a:rPr lang="en-US" i="1" dirty="0" err="1"/>
+              <a:t>x</a:t>
+            </a:r>
+            <a:r>
+              <a:rPr lang="en-US" i="1" baseline="-25000" dirty="0" err="1"/>
+              <a:t>n</a:t>
+            </a:r>
+            <a:r>
+              <a:rPr lang="en-US" i="1" dirty="0"/>
+              <a:t>) = f(</a:t>
+            </a:r>
+            <a:r>
+              <a:rPr lang="en-US" i="1" dirty="0" smtClean="0"/>
+              <a:t>x</a:t>
+            </a:r>
+            <a:r>
+              <a:rPr lang="en-US" i="1" baseline="-25000" dirty="0" smtClean="0"/>
+              <a:t>1</a:t>
+            </a:r>
+            <a:r>
+              <a:rPr lang="en-US" i="1" dirty="0" smtClean="0"/>
+              <a:t>) × f</a:t>
+            </a:r>
+            <a:r>
+              <a:rPr lang="en-US" i="1" dirty="0"/>
+              <a:t>(x</a:t>
+            </a:r>
+            <a:r>
+              <a:rPr lang="en-US" i="1" baseline="-25000" dirty="0"/>
+              <a:t>2</a:t>
+            </a:r>
+            <a:r>
+              <a:rPr lang="en-US" i="1" dirty="0" smtClean="0"/>
+              <a:t>)</a:t>
+            </a:r>
+            <a:r>
+              <a:rPr lang="en-US" i="1" dirty="0"/>
+              <a:t> </a:t>
+            </a:r>
+            <a:r>
+              <a:rPr lang="en-US" i="1" dirty="0" smtClean="0"/>
+              <a:t>× … × f</a:t>
+            </a:r>
+            <a:r>
+              <a:rPr lang="en-US" i="1" dirty="0"/>
+              <a:t>(</a:t>
+            </a:r>
+            <a:r>
+              <a:rPr lang="en-US" i="1" dirty="0" err="1" smtClean="0"/>
+              <a:t>x</a:t>
+            </a:r>
+            <a:r>
+              <a:rPr lang="en-US" i="1" baseline="-25000" dirty="0" err="1" smtClean="0"/>
+              <a:t>n</a:t>
+            </a:r>
+            <a:r>
+              <a:rPr lang="en-US" i="1" dirty="0" smtClean="0"/>
+              <a:t>)  =</a:t>
+            </a:r>
+          </a:p>
+          <a:p>
+            <a:pPr marL="0" indent="0">
+              <a:buNone/>
+            </a:pPr>
+            <a:endParaRPr lang="en-US" dirty="0"/>
+          </a:p>
+          <a:p>
+            <a:pPr marL="0" indent="0">
+              <a:buNone/>
+            </a:pPr>
+            <a:r>
+              <a:rPr lang="en-US" dirty="0"/>
+              <a:t>Since </a:t>
+            </a:r>
+            <a:r>
+              <a:rPr lang="en-US" i="1" dirty="0"/>
+              <a:t>X</a:t>
+            </a:r>
+            <a:r>
+              <a:rPr lang="en-US" i="1" baseline="-25000" dirty="0"/>
+              <a:t>1</a:t>
+            </a:r>
+            <a:r>
+              <a:rPr lang="en-US" i="1" dirty="0"/>
+              <a:t>, X</a:t>
+            </a:r>
+            <a:r>
+              <a:rPr lang="en-US" i="1" baseline="-25000" dirty="0"/>
+              <a:t>2</a:t>
+            </a:r>
+            <a:r>
+              <a:rPr lang="en-US" i="1" dirty="0"/>
+              <a:t>, …</a:t>
+            </a:r>
+            <a:r>
+              <a:rPr lang="en-US" i="1" dirty="0" err="1"/>
+              <a:t>X</a:t>
+            </a:r>
+            <a:r>
+              <a:rPr lang="en-US" i="1" baseline="-25000" dirty="0" err="1"/>
+              <a:t>n</a:t>
+            </a:r>
+            <a:r>
+              <a:rPr lang="en-US" baseline="-25000" dirty="0"/>
+              <a:t> </a:t>
+            </a:r>
+            <a:r>
+              <a:rPr lang="en-US" dirty="0"/>
+              <a:t>are </a:t>
+            </a:r>
+            <a:r>
+              <a:rPr lang="en-US" b="1" dirty="0" smtClean="0">
+                <a:solidFill>
+                  <a:srgbClr val="000000"/>
+                </a:solidFill>
+                <a:latin typeface="Lobster Two"/>
+                <a:cs typeface="Lobster Two"/>
+              </a:rPr>
+              <a:t>mutually independent, </a:t>
+            </a:r>
+            <a:r>
+              <a:rPr lang="en-US" dirty="0" smtClean="0"/>
+              <a:t>the probabilities P(</a:t>
+            </a:r>
+            <a:r>
+              <a:rPr lang="en-US" i="1" dirty="0" smtClean="0"/>
+              <a:t>X</a:t>
+            </a:r>
+            <a:r>
+              <a:rPr lang="en-US" i="1" baseline="-25000" dirty="0" smtClean="0"/>
+              <a:t>1</a:t>
+            </a:r>
+            <a:r>
+              <a:rPr lang="en-US" i="1" dirty="0" smtClean="0"/>
+              <a:t>), P(X</a:t>
+            </a:r>
+            <a:r>
+              <a:rPr lang="en-US" i="1" baseline="-25000" dirty="0" smtClean="0"/>
+              <a:t>2</a:t>
+            </a:r>
+            <a:r>
+              <a:rPr lang="en-US" i="1" dirty="0" smtClean="0"/>
+              <a:t>), …P(</a:t>
+            </a:r>
+            <a:r>
+              <a:rPr lang="en-US" i="1" dirty="0" err="1" smtClean="0"/>
+              <a:t>X</a:t>
+            </a:r>
+            <a:r>
+              <a:rPr lang="en-US" i="1" baseline="-25000" dirty="0" err="1" smtClean="0"/>
+              <a:t>n</a:t>
+            </a:r>
+            <a:r>
+              <a:rPr lang="en-US" i="1" dirty="0" smtClean="0"/>
+              <a:t>)</a:t>
+            </a:r>
+            <a:r>
+              <a:rPr lang="en-US" baseline="-25000" dirty="0" smtClean="0"/>
+              <a:t> </a:t>
+            </a:r>
+            <a:r>
+              <a:rPr lang="en-US" dirty="0" smtClean="0"/>
+              <a:t>can simply be multiplied to get the joint </a:t>
+            </a:r>
+            <a:r>
+              <a:rPr lang="en-US" dirty="0" err="1" smtClean="0"/>
+              <a:t>pdf</a:t>
+            </a:r>
+            <a:r>
+              <a:rPr lang="en-US" dirty="0" smtClean="0"/>
+              <a:t> of the sequence of observations of the </a:t>
+            </a:r>
+            <a:r>
+              <a:rPr lang="en-US" dirty="0" err="1" smtClean="0"/>
+              <a:t>rv</a:t>
+            </a:r>
+            <a:r>
+              <a:rPr lang="en-US" dirty="0" smtClean="0"/>
+              <a:t> of interest</a:t>
+            </a:r>
+          </a:p>
+          <a:p>
+            <a:pPr marL="0" indent="0">
+              <a:buNone/>
+            </a:pPr>
+            <a:endParaRPr lang="en-US" dirty="0"/>
+          </a:p>
+          <a:p>
+            <a:pPr marL="0" indent="0">
+              <a:buNone/>
+            </a:pPr>
+            <a:r>
+              <a:rPr lang="en-US" dirty="0"/>
+              <a:t>Since </a:t>
+            </a:r>
+            <a:r>
+              <a:rPr lang="en-US" i="1" dirty="0"/>
+              <a:t>X</a:t>
+            </a:r>
+            <a:r>
+              <a:rPr lang="en-US" i="1" baseline="-25000" dirty="0"/>
+              <a:t>1</a:t>
+            </a:r>
+            <a:r>
+              <a:rPr lang="en-US" i="1" dirty="0"/>
+              <a:t>, X</a:t>
+            </a:r>
+            <a:r>
+              <a:rPr lang="en-US" i="1" baseline="-25000" dirty="0"/>
+              <a:t>2</a:t>
+            </a:r>
+            <a:r>
+              <a:rPr lang="en-US" i="1" dirty="0"/>
+              <a:t>, …</a:t>
+            </a:r>
+            <a:r>
+              <a:rPr lang="en-US" i="1" dirty="0" err="1"/>
+              <a:t>X</a:t>
+            </a:r>
+            <a:r>
+              <a:rPr lang="en-US" i="1" baseline="-25000" dirty="0" err="1"/>
+              <a:t>n</a:t>
+            </a:r>
+            <a:r>
+              <a:rPr lang="en-US" baseline="-25000" dirty="0"/>
+              <a:t> </a:t>
+            </a:r>
+            <a:r>
+              <a:rPr lang="en-US" dirty="0"/>
+              <a:t>are </a:t>
+            </a:r>
+            <a:r>
+              <a:rPr lang="en-US" b="1" dirty="0">
+                <a:solidFill>
+                  <a:srgbClr val="000000"/>
+                </a:solidFill>
+                <a:latin typeface="Lobster Two"/>
+                <a:cs typeface="Lobster Two"/>
+              </a:rPr>
+              <a:t>identically distributed</a:t>
+            </a:r>
+            <a:r>
+              <a:rPr lang="en-US" dirty="0"/>
+              <a:t>, all marginal densities </a:t>
+            </a:r>
+            <a:r>
+              <a:rPr lang="en-US" i="1" dirty="0"/>
+              <a:t>f(x</a:t>
+            </a:r>
+            <a:r>
+              <a:rPr lang="en-US" i="1" baseline="-25000" dirty="0"/>
+              <a:t>i</a:t>
+            </a:r>
+            <a:r>
+              <a:rPr lang="en-US" i="1" dirty="0"/>
+              <a:t>) </a:t>
+            </a:r>
+            <a:r>
+              <a:rPr lang="en-US" dirty="0"/>
+              <a:t>are the exact same function</a:t>
+            </a:r>
+          </a:p>
+          <a:p>
+            <a:pPr marL="0" indent="0">
+              <a:buNone/>
+            </a:pPr>
+            <a:endParaRPr lang="en-US" dirty="0"/>
+          </a:p>
+          <a:p>
+            <a:pPr marL="0" indent="0">
+              <a:buNone/>
+            </a:pPr>
+            <a:endParaRPr lang="en-US" dirty="0"/>
+          </a:p>
+        </p:txBody>
+      </p:sp>
       <p:pic>
         <p:nvPicPr>
           <p:cNvPr id="6" name="Picture 5"/>
@@ -11460,7 +11453,7 @@
           <a:p>
             <a:pPr algn="ctr"/>
             <a:r>
-              <a:rPr lang="en-US" sz="2000" dirty="0" smtClean="0">
+              <a:rPr lang="en-US" dirty="0" smtClean="0">
                 <a:solidFill>
                   <a:schemeClr val="tx1"/>
                 </a:solidFill>
@@ -11470,7 +11463,7 @@
               <a:t>After the sample </a:t>
             </a:r>
             <a:r>
-              <a:rPr lang="en-US" sz="2000" i="1" dirty="0" smtClean="0">
+              <a:rPr lang="en-US" i="1" dirty="0" smtClean="0">
                 <a:solidFill>
                   <a:schemeClr val="tx1"/>
                 </a:solidFill>
@@ -11480,7 +11473,7 @@
               <a:t>X</a:t>
             </a:r>
             <a:r>
-              <a:rPr lang="en-US" sz="2000" i="1" baseline="-25000" dirty="0" smtClean="0">
+              <a:rPr lang="en-US" i="1" baseline="-25000" dirty="0" smtClean="0">
                 <a:solidFill>
                   <a:schemeClr val="tx1"/>
                 </a:solidFill>
@@ -11490,7 +11483,7 @@
               <a:t>1</a:t>
             </a:r>
             <a:r>
-              <a:rPr lang="en-US" sz="2000" i="1" dirty="0">
+              <a:rPr lang="en-US" i="1" dirty="0">
                 <a:solidFill>
                   <a:schemeClr val="tx1"/>
                 </a:solidFill>
@@ -11500,7 +11493,7 @@
               <a:t>, X</a:t>
             </a:r>
             <a:r>
-              <a:rPr lang="en-US" sz="2000" i="1" baseline="-25000" dirty="0">
+              <a:rPr lang="en-US" i="1" baseline="-25000" dirty="0">
                 <a:solidFill>
                   <a:schemeClr val="tx1"/>
                 </a:solidFill>
@@ -11510,7 +11503,7 @@
               <a:t>2</a:t>
             </a:r>
             <a:r>
-              <a:rPr lang="en-US" sz="2000" i="1" dirty="0">
+              <a:rPr lang="en-US" i="1" dirty="0">
                 <a:solidFill>
                   <a:schemeClr val="tx1"/>
                 </a:solidFill>
@@ -11520,7 +11513,7 @@
               <a:t>, …</a:t>
             </a:r>
             <a:r>
-              <a:rPr lang="en-US" sz="2000" i="1" dirty="0" err="1">
+              <a:rPr lang="en-US" i="1" dirty="0" err="1">
                 <a:solidFill>
                   <a:schemeClr val="tx1"/>
                 </a:solidFill>
@@ -11530,7 +11523,7 @@
               <a:t>X</a:t>
             </a:r>
             <a:r>
-              <a:rPr lang="en-US" sz="2000" i="1" baseline="-25000" dirty="0" err="1">
+              <a:rPr lang="en-US" i="1" baseline="-25000" dirty="0" err="1">
                 <a:solidFill>
                   <a:schemeClr val="tx1"/>
                 </a:solidFill>
@@ -11540,7 +11533,7 @@
               <a:t>n</a:t>
             </a:r>
             <a:r>
-              <a:rPr lang="en-US" sz="2000" baseline="-25000" dirty="0">
+              <a:rPr lang="en-US" baseline="-25000" dirty="0">
                 <a:solidFill>
                   <a:schemeClr val="tx1"/>
                 </a:solidFill>
@@ -11550,7 +11543,7 @@
               <a:t> </a:t>
             </a:r>
             <a:r>
-              <a:rPr lang="en-US" sz="2000" dirty="0">
+              <a:rPr lang="en-US" dirty="0">
                 <a:solidFill>
                   <a:schemeClr val="tx1"/>
                 </a:solidFill>
@@ -11560,7 +11553,7 @@
               <a:t> </a:t>
             </a:r>
             <a:r>
-              <a:rPr lang="en-US" sz="2000" dirty="0" smtClean="0">
+              <a:rPr lang="en-US" dirty="0" smtClean="0">
                 <a:solidFill>
                   <a:schemeClr val="tx1"/>
                 </a:solidFill>
@@ -11570,7 +11563,7 @@
               <a:t>is drawn, we usually want to create some summary of the </a:t>
             </a:r>
             <a:r>
-              <a:rPr lang="en-US" sz="2000" i="1" dirty="0" smtClean="0">
+              <a:rPr lang="en-US" i="1" dirty="0" smtClean="0">
                 <a:solidFill>
                   <a:schemeClr val="tx1"/>
                 </a:solidFill>
@@ -11580,7 +11573,7 @@
               <a:t>x</a:t>
             </a:r>
             <a:r>
-              <a:rPr lang="en-US" sz="2000" i="1" baseline="-25000" dirty="0">
+              <a:rPr lang="en-US" i="1" baseline="-25000" dirty="0">
                 <a:solidFill>
                   <a:schemeClr val="tx1"/>
                 </a:solidFill>
@@ -11590,7 +11583,7 @@
               <a:t>i</a:t>
             </a:r>
             <a:r>
-              <a:rPr lang="en-US" sz="2000" dirty="0" smtClean="0">
+              <a:rPr lang="en-US" dirty="0" smtClean="0">
                 <a:solidFill>
                   <a:schemeClr val="tx1"/>
                 </a:solidFill>
@@ -11599,7 +11592,7 @@
               </a:rPr>
               <a:t> values</a:t>
             </a:r>
-            <a:endParaRPr lang="en-US" sz="2000" dirty="0">
+            <a:endParaRPr lang="en-US" dirty="0">
               <a:solidFill>
                 <a:schemeClr val="tx1"/>
               </a:solidFill>
@@ -12283,7 +12276,7 @@
         <p:spPr>
           <a:xfrm>
             <a:off x="6229349" y="4580383"/>
-            <a:ext cx="850900" cy="369332"/>
+            <a:ext cx="1057912" cy="369332"/>
           </a:xfrm>
           <a:prstGeom prst="rect">
             <a:avLst/>
@@ -12870,7 +12863,23 @@
             <a:pPr lvl="1"/>
             <a:r>
               <a:rPr lang="en-US" dirty="0" smtClean="0"/>
-              <a:t>Think of sample as collection/sequence of </a:t>
+              <a:t>Think of </a:t>
+            </a:r>
+            <a:r>
+              <a:rPr lang="en-US" dirty="0" smtClean="0"/>
+              <a:t>a sample </a:t>
+            </a:r>
+            <a:r>
+              <a:rPr lang="en-US" dirty="0" smtClean="0"/>
+              <a:t>as </a:t>
+            </a:r>
+            <a:r>
+              <a:rPr lang="en-US" dirty="0" smtClean="0"/>
+              <a:t>a collection/sequence </a:t>
+            </a:r>
+            <a:r>
+              <a:rPr lang="en-US" dirty="0" smtClean="0"/>
+              <a:t>of </a:t>
             </a:r>
             <a:r>
               <a:rPr lang="en-US" dirty="0" err="1" smtClean="0"/>
@@ -13267,8 +13276,8 @@
         </p:nvSpPr>
         <p:spPr>
           <a:xfrm>
-            <a:off x="5537200" y="5270500"/>
-            <a:ext cx="1600199" cy="1206500"/>
+            <a:off x="5299114" y="5270500"/>
+            <a:ext cx="1838286" cy="1206500"/>
           </a:xfrm>
           <a:prstGeom prst="wedgeEllipseCallout">
             <a:avLst>
@@ -13591,8 +13600,8 @@
         </p:nvSpPr>
         <p:spPr>
           <a:xfrm>
-            <a:off x="5537200" y="5270500"/>
-            <a:ext cx="1600199" cy="1206500"/>
+            <a:off x="5387248" y="5270500"/>
+            <a:ext cx="1750151" cy="1206500"/>
           </a:xfrm>
           <a:prstGeom prst="wedgeEllipseCallout">
             <a:avLst>
@@ -13897,8 +13906,8 @@
         </p:nvSpPr>
         <p:spPr>
           <a:xfrm>
-            <a:off x="5537200" y="5270500"/>
-            <a:ext cx="1600199" cy="1206500"/>
+            <a:off x="5397500" y="5270500"/>
+            <a:ext cx="1739899" cy="1206500"/>
           </a:xfrm>
           <a:prstGeom prst="wedgeEllipseCallout">
             <a:avLst>
@@ -14413,8 +14422,8 @@
         </p:nvSpPr>
         <p:spPr>
           <a:xfrm>
-            <a:off x="5537200" y="5270500"/>
-            <a:ext cx="1600199" cy="1206500"/>
+            <a:off x="5510196" y="5270500"/>
+            <a:ext cx="1627203" cy="1206500"/>
           </a:xfrm>
           <a:prstGeom prst="wedgeEllipseCallout">
             <a:avLst>
@@ -14924,7 +14933,7 @@
         </p:blipFill>
         <p:spPr>
           <a:xfrm>
-            <a:off x="2260600" y="5791200"/>
+            <a:off x="3648726" y="5846285"/>
             <a:ext cx="4622800" cy="469900"/>
           </a:xfrm>
           <a:prstGeom prst="rect">
@@ -14940,7 +14949,7 @@
         </p:nvSpPr>
         <p:spPr>
           <a:xfrm>
-            <a:off x="3238500" y="6469618"/>
+            <a:off x="5552050" y="6469618"/>
             <a:ext cx="3289300" cy="369332"/>
           </a:xfrm>
           <a:prstGeom prst="rect">
@@ -15032,7 +15041,7 @@
               <a:t>) </a:t>
             </a:r>
             <a:r>
-              <a:rPr lang="en-US" smtClean="0">
+              <a:rPr lang="en-US" dirty="0" smtClean="0">
                 <a:solidFill>
                   <a:schemeClr val="accent1"/>
                 </a:solidFill>
@@ -15042,14 +15051,6 @@
               </a:rPr>
               <a:t>= 𝜇</a:t>
             </a:r>
-            <a:endParaRPr lang="en-US" dirty="0" smtClean="0">
-              <a:solidFill>
-                <a:schemeClr val="accent1"/>
-              </a:solidFill>
-              <a:latin typeface="Lato" charset="0"/>
-              <a:ea typeface="Lato" charset="0"/>
-              <a:cs typeface="Lato" charset="0"/>
-            </a:endParaRPr>
           </a:p>
         </p:txBody>
       </p:sp>
@@ -16188,7 +16189,7 @@
         </p:nvCxnSpPr>
         <p:spPr>
           <a:xfrm>
-            <a:off x="4565650" y="2108200"/>
+            <a:off x="4565650" y="1843792"/>
             <a:ext cx="0" cy="1270000"/>
           </a:xfrm>
           <a:prstGeom prst="line">
@@ -16233,7 +16234,7 @@
         </p:blipFill>
         <p:spPr>
           <a:xfrm>
-            <a:off x="3206750" y="1092200"/>
+            <a:off x="3206750" y="827792"/>
             <a:ext cx="2717800" cy="1016000"/>
           </a:xfrm>
           <a:prstGeom prst="rect">
@@ -16545,14 +16546,14 @@
             <p:ph idx="1"/>
             <p:extLst>
               <p:ext uri="{D42A27DB-BD31-4B8C-83A1-F6EECF244321}">
-                <p14:modId xmlns:p14="http://schemas.microsoft.com/office/powerpoint/2010/main" val="3285380481"/>
+                <p14:modId xmlns:p14="http://schemas.microsoft.com/office/powerpoint/2010/main" val="2864171328"/>
               </p:ext>
             </p:extLst>
           </p:nvPr>
         </p:nvGraphicFramePr>
         <p:xfrm>
           <a:off x="457200" y="1600200"/>
-          <a:ext cx="8407401" cy="3362960"/>
+          <a:ext cx="8407401" cy="3606800"/>
         </p:xfrm>
         <a:graphic>
           <a:graphicData uri="http://schemas.openxmlformats.org/drawingml/2006/table">
@@ -16562,8 +16563,8 @@
               </a:tblPr>
               <a:tblGrid>
                 <a:gridCol w="629067"/>
-                <a:gridCol w="537963"/>
-                <a:gridCol w="3714240"/>
+                <a:gridCol w="654398"/>
+                <a:gridCol w="3597805"/>
                 <a:gridCol w="3526131"/>
               </a:tblGrid>
               <a:tr h="370840">
@@ -18091,7 +18092,7 @@
         </p:nvSpPr>
         <p:spPr>
           <a:xfrm>
-            <a:off x="3429000" y="5089525"/>
+            <a:off x="3384931" y="5265797"/>
             <a:ext cx="3886200" cy="920750"/>
           </a:xfrm>
           <a:prstGeom prst="wedgeEllipseCallout">
@@ -18546,7 +18547,7 @@
         </p:blipFill>
         <p:spPr>
           <a:xfrm>
-            <a:off x="3441700" y="1587500"/>
+            <a:off x="3441700" y="1565466"/>
             <a:ext cx="2260600" cy="520700"/>
           </a:xfrm>
           <a:prstGeom prst="rect">
@@ -23947,34 +23948,6 @@
           </a:p>
         </p:txBody>
       </p:sp>
-      <p:sp>
-        <p:nvSpPr>
-          <p:cNvPr id="3" name="Text Placeholder 2"/>
-          <p:cNvSpPr>
-            <a:spLocks noGrp="1"/>
-          </p:cNvSpPr>
-          <p:nvPr>
-            <p:ph type="body" idx="1"/>
-          </p:nvPr>
-        </p:nvSpPr>
-        <p:spPr/>
-        <p:txBody>
-          <a:bodyPr>
-            <a:noAutofit/>
-          </a:bodyPr>
-          <a:lstStyle/>
-          <a:p>
-            <a:endParaRPr lang="en-US" sz="6000" dirty="0">
-              <a:solidFill>
-                <a:srgbClr val="66A7B9"/>
-              </a:solidFill>
-              <a:effectLst/>
-              <a:latin typeface="Porter Sans Block"/>
-              <a:cs typeface="Porter Sans Block"/>
-            </a:endParaRPr>
-          </a:p>
-        </p:txBody>
-      </p:sp>
     </p:spTree>
     <p:extLst>
       <p:ext uri="{BB962C8B-B14F-4D97-AF65-F5344CB8AC3E}">
@@ -24849,25 +24822,6 @@
               <a:t>Step 2: what are the sample means of all possible samples in sample space?</a:t>
             </a:r>
             <a:endParaRPr lang="en-US" dirty="0"/>
-          </a:p>
-        </p:txBody>
-      </p:sp>
-      <p:sp>
-        <p:nvSpPr>
-          <p:cNvPr id="6" name="Content Placeholder 5"/>
-          <p:cNvSpPr>
-            <a:spLocks noGrp="1"/>
-          </p:cNvSpPr>
-          <p:nvPr>
-            <p:ph idx="1"/>
-          </p:nvPr>
-        </p:nvSpPr>
-        <p:spPr/>
-        <p:txBody>
-          <a:bodyPr/>
-          <a:lstStyle/>
-          <a:p>
-            <a:endParaRPr lang="en-US"/>
           </a:p>
         </p:txBody>
       </p:sp>
@@ -34912,8 +34866,8 @@
         </p:nvSpPr>
         <p:spPr>
           <a:xfrm>
-            <a:off x="6134100" y="1657560"/>
-            <a:ext cx="1663700" cy="646331"/>
+            <a:off x="6134099" y="1657560"/>
+            <a:ext cx="2106517" cy="646331"/>
           </a:xfrm>
           <a:prstGeom prst="rect">
             <a:avLst/>
@@ -35031,8 +34985,8 @@
         </p:nvSpPr>
         <p:spPr>
           <a:xfrm>
-            <a:off x="6565900" y="2364458"/>
-            <a:ext cx="1638300" cy="646331"/>
+            <a:off x="6565899" y="2364458"/>
+            <a:ext cx="1983189" cy="646331"/>
           </a:xfrm>
           <a:prstGeom prst="rect">
             <a:avLst/>
@@ -35316,7 +35270,7 @@
         <p:spPr>
           <a:xfrm flipH="1">
             <a:off x="4836161" y="1980726"/>
-            <a:ext cx="1297939" cy="383263"/>
+            <a:ext cx="1297938" cy="383263"/>
           </a:xfrm>
           <a:prstGeom prst="line">
             <a:avLst/>
@@ -35355,7 +35309,7 @@
         <p:spPr>
           <a:xfrm flipH="1">
             <a:off x="5788661" y="2687624"/>
-            <a:ext cx="777239" cy="4618"/>
+            <a:ext cx="777238" cy="4618"/>
           </a:xfrm>
           <a:prstGeom prst="line">
             <a:avLst/>
@@ -35515,8 +35469,8 @@
         </p:nvSpPr>
         <p:spPr>
           <a:xfrm>
-            <a:off x="6350001" y="4436050"/>
-            <a:ext cx="1638300" cy="646331"/>
+            <a:off x="6350000" y="4436050"/>
+            <a:ext cx="1890615" cy="646331"/>
           </a:xfrm>
           <a:prstGeom prst="rect">
             <a:avLst/>
@@ -35619,7 +35573,7 @@
         <p:spPr>
           <a:xfrm flipH="1">
             <a:off x="5572762" y="4759216"/>
-            <a:ext cx="777239" cy="6866"/>
+            <a:ext cx="777238" cy="6866"/>
           </a:xfrm>
           <a:prstGeom prst="line">
             <a:avLst/>
@@ -39300,8 +39254,8 @@
         </p:nvSpPr>
         <p:spPr>
           <a:xfrm>
-            <a:off x="6372859" y="4583965"/>
-            <a:ext cx="850900" cy="369332"/>
+            <a:off x="6372858" y="4583965"/>
+            <a:ext cx="990601" cy="369332"/>
           </a:xfrm>
           <a:prstGeom prst="rect">
             <a:avLst/>
@@ -39391,7 +39345,7 @@
         <p:spPr>
           <a:xfrm flipH="1">
             <a:off x="5610862" y="4768631"/>
-            <a:ext cx="761997" cy="7162"/>
+            <a:ext cx="761996" cy="7162"/>
           </a:xfrm>
           <a:prstGeom prst="line">
             <a:avLst/>
@@ -41340,8 +41294,8 @@
         </p:nvSpPr>
         <p:spPr>
           <a:xfrm>
-            <a:off x="6311900" y="2159156"/>
-            <a:ext cx="873760" cy="369332"/>
+            <a:off x="6311900" y="2148139"/>
+            <a:ext cx="975360" cy="369332"/>
           </a:xfrm>
           <a:prstGeom prst="rect">
             <a:avLst/>
@@ -41536,8 +41490,8 @@
         </p:nvCxnSpPr>
         <p:spPr>
           <a:xfrm flipH="1">
-            <a:off x="5788661" y="2343822"/>
-            <a:ext cx="523239" cy="348420"/>
+            <a:off x="5788661" y="2332805"/>
+            <a:ext cx="523239" cy="359437"/>
           </a:xfrm>
           <a:prstGeom prst="line">
             <a:avLst/>
@@ -41612,7 +41566,7 @@
         <p:spPr>
           <a:xfrm>
             <a:off x="6226808" y="4593083"/>
-            <a:ext cx="850900" cy="369332"/>
+            <a:ext cx="958852" cy="369332"/>
           </a:xfrm>
           <a:prstGeom prst="rect">
             <a:avLst/>

</xml_diff>